<commit_message>
Fix formatting; Add Wnioski
</commit_message>
<xml_diff>
--- a/presentation-prac-inz.pptx
+++ b/presentation-prac-inz.pptx
@@ -11,7 +11,8 @@
     <p:sldId id="259" r:id="rId5"/>
     <p:sldId id="260" r:id="rId6"/>
     <p:sldId id="261" r:id="rId7"/>
-    <p:sldId id="262" r:id="rId8"/>
+    <p:sldId id="263" r:id="rId8"/>
+    <p:sldId id="262" r:id="rId9"/>
   </p:sldIdLst>
   <p:sldSz cx="12192000" cy="6858000"/>
   <p:notesSz cx="6858000" cy="9144000"/>
@@ -267,7 +268,7 @@
           <a:p>
             <a:fld id="{CFA18FAF-0FEE-4196-98C2-B5A830101FEE}" type="datetimeFigureOut">
               <a:rPr lang="en-CA" smtClean="0"/>
-              <a:t>2023-12-15</a:t>
+              <a:t>2023-12-31</a:t>
             </a:fld>
             <a:endParaRPr lang="en-CA"/>
           </a:p>
@@ -467,7 +468,7 @@
           <a:p>
             <a:fld id="{CFA18FAF-0FEE-4196-98C2-B5A830101FEE}" type="datetimeFigureOut">
               <a:rPr lang="en-CA" smtClean="0"/>
-              <a:t>2023-12-15</a:t>
+              <a:t>2023-12-31</a:t>
             </a:fld>
             <a:endParaRPr lang="en-CA"/>
           </a:p>
@@ -677,7 +678,7 @@
           <a:p>
             <a:fld id="{CFA18FAF-0FEE-4196-98C2-B5A830101FEE}" type="datetimeFigureOut">
               <a:rPr lang="en-CA" smtClean="0"/>
-              <a:t>2023-12-15</a:t>
+              <a:t>2023-12-31</a:t>
             </a:fld>
             <a:endParaRPr lang="en-CA"/>
           </a:p>
@@ -877,7 +878,7 @@
           <a:p>
             <a:fld id="{CFA18FAF-0FEE-4196-98C2-B5A830101FEE}" type="datetimeFigureOut">
               <a:rPr lang="en-CA" smtClean="0"/>
-              <a:t>2023-12-15</a:t>
+              <a:t>2023-12-31</a:t>
             </a:fld>
             <a:endParaRPr lang="en-CA"/>
           </a:p>
@@ -1153,7 +1154,7 @@
           <a:p>
             <a:fld id="{CFA18FAF-0FEE-4196-98C2-B5A830101FEE}" type="datetimeFigureOut">
               <a:rPr lang="en-CA" smtClean="0"/>
-              <a:t>2023-12-15</a:t>
+              <a:t>2023-12-31</a:t>
             </a:fld>
             <a:endParaRPr lang="en-CA"/>
           </a:p>
@@ -1421,7 +1422,7 @@
           <a:p>
             <a:fld id="{CFA18FAF-0FEE-4196-98C2-B5A830101FEE}" type="datetimeFigureOut">
               <a:rPr lang="en-CA" smtClean="0"/>
-              <a:t>2023-12-15</a:t>
+              <a:t>2023-12-31</a:t>
             </a:fld>
             <a:endParaRPr lang="en-CA"/>
           </a:p>
@@ -1836,7 +1837,7 @@
           <a:p>
             <a:fld id="{CFA18FAF-0FEE-4196-98C2-B5A830101FEE}" type="datetimeFigureOut">
               <a:rPr lang="en-CA" smtClean="0"/>
-              <a:t>2023-12-15</a:t>
+              <a:t>2023-12-31</a:t>
             </a:fld>
             <a:endParaRPr lang="en-CA"/>
           </a:p>
@@ -1978,7 +1979,7 @@
           <a:p>
             <a:fld id="{CFA18FAF-0FEE-4196-98C2-B5A830101FEE}" type="datetimeFigureOut">
               <a:rPr lang="en-CA" smtClean="0"/>
-              <a:t>2023-12-15</a:t>
+              <a:t>2023-12-31</a:t>
             </a:fld>
             <a:endParaRPr lang="en-CA"/>
           </a:p>
@@ -2091,7 +2092,7 @@
           <a:p>
             <a:fld id="{CFA18FAF-0FEE-4196-98C2-B5A830101FEE}" type="datetimeFigureOut">
               <a:rPr lang="en-CA" smtClean="0"/>
-              <a:t>2023-12-15</a:t>
+              <a:t>2023-12-31</a:t>
             </a:fld>
             <a:endParaRPr lang="en-CA"/>
           </a:p>
@@ -2404,7 +2405,7 @@
           <a:p>
             <a:fld id="{CFA18FAF-0FEE-4196-98C2-B5A830101FEE}" type="datetimeFigureOut">
               <a:rPr lang="en-CA" smtClean="0"/>
-              <a:t>2023-12-15</a:t>
+              <a:t>2023-12-31</a:t>
             </a:fld>
             <a:endParaRPr lang="en-CA"/>
           </a:p>
@@ -2693,7 +2694,7 @@
           <a:p>
             <a:fld id="{CFA18FAF-0FEE-4196-98C2-B5A830101FEE}" type="datetimeFigureOut">
               <a:rPr lang="en-CA" smtClean="0"/>
-              <a:t>2023-12-15</a:t>
+              <a:t>2023-12-31</a:t>
             </a:fld>
             <a:endParaRPr lang="en-CA"/>
           </a:p>
@@ -2936,7 +2937,7 @@
           <a:p>
             <a:fld id="{CFA18FAF-0FEE-4196-98C2-B5A830101FEE}" type="datetimeFigureOut">
               <a:rPr lang="en-CA" smtClean="0"/>
-              <a:t>2023-12-15</a:t>
+              <a:t>2023-12-31</a:t>
             </a:fld>
             <a:endParaRPr lang="en-CA"/>
           </a:p>
@@ -3598,6 +3599,34 @@
               <a:rPr lang="pl-PL" dirty="0"/>
               <a:t>Cel pracy</a:t>
             </a:r>
+            <a:r>
+              <a:rPr lang="en-US" dirty="0"/>
+              <a:t> (</a:t>
+            </a:r>
+            <a:r>
+              <a:rPr lang="en-US" dirty="0" err="1"/>
+              <a:t>bardziej</a:t>
+            </a:r>
+            <a:r>
+              <a:rPr lang="en-US" dirty="0"/>
+              <a:t> </a:t>
+            </a:r>
+            <a:r>
+              <a:rPr lang="en-US" dirty="0" err="1"/>
+              <a:t>opisac</a:t>
+            </a:r>
+            <a:r>
+              <a:rPr lang="en-US" dirty="0"/>
+              <a:t> </a:t>
+            </a:r>
+            <a:r>
+              <a:rPr lang="en-US" dirty="0" err="1"/>
+              <a:t>dlaczego</a:t>
+            </a:r>
+            <a:r>
+              <a:rPr lang="en-US" dirty="0"/>
+              <a:t> I po co)</a:t>
+            </a:r>
             <a:endParaRPr lang="en-CA" dirty="0"/>
           </a:p>
         </p:txBody>
@@ -4115,6 +4144,98 @@
 </file>
 
 <file path=ppt/slides/slide7.xml><?xml version="1.0" encoding="utf-8"?>
+<p:sld xmlns:a="http://schemas.openxmlformats.org/drawingml/2006/main" xmlns:r="http://schemas.openxmlformats.org/officeDocument/2006/relationships" xmlns:p="http://schemas.openxmlformats.org/presentationml/2006/main">
+  <p:cSld>
+    <p:spTree>
+      <p:nvGrpSpPr>
+        <p:cNvPr id="1" name=""/>
+        <p:cNvGrpSpPr/>
+        <p:nvPr/>
+      </p:nvGrpSpPr>
+      <p:grpSpPr>
+        <a:xfrm>
+          <a:off x="0" y="0"/>
+          <a:ext cx="0" cy="0"/>
+          <a:chOff x="0" y="0"/>
+          <a:chExt cx="0" cy="0"/>
+        </a:xfrm>
+      </p:grpSpPr>
+      <p:sp>
+        <p:nvSpPr>
+          <p:cNvPr id="2" name="Title 1">
+            <a:extLst>
+              <a:ext uri="{FF2B5EF4-FFF2-40B4-BE49-F238E27FC236}">
+                <a16:creationId xmlns:a16="http://schemas.microsoft.com/office/drawing/2014/main" id="{533D0A60-4340-E65F-E3E5-C87A84BC5ED0}"/>
+              </a:ext>
+            </a:extLst>
+          </p:cNvPr>
+          <p:cNvSpPr>
+            <a:spLocks noGrp="1"/>
+          </p:cNvSpPr>
+          <p:nvPr>
+            <p:ph type="title"/>
+          </p:nvPr>
+        </p:nvSpPr>
+        <p:spPr/>
+        <p:txBody>
+          <a:bodyPr/>
+          <a:lstStyle/>
+          <a:p>
+            <a:r>
+              <a:rPr lang="en-US" dirty="0" err="1"/>
+              <a:t>Schemat</a:t>
+            </a:r>
+            <a:r>
+              <a:rPr lang="en-US" dirty="0"/>
+              <a:t> </a:t>
+            </a:r>
+            <a:r>
+              <a:rPr lang="en-US" dirty="0" err="1"/>
+              <a:t>blokowy</a:t>
+            </a:r>
+            <a:endParaRPr lang="en-CA" dirty="0"/>
+          </a:p>
+        </p:txBody>
+      </p:sp>
+      <p:sp>
+        <p:nvSpPr>
+          <p:cNvPr id="3" name="Content Placeholder 2">
+            <a:extLst>
+              <a:ext uri="{FF2B5EF4-FFF2-40B4-BE49-F238E27FC236}">
+                <a16:creationId xmlns:a16="http://schemas.microsoft.com/office/drawing/2014/main" id="{819AF37C-2F6C-5601-0897-1D7D315CE45E}"/>
+              </a:ext>
+            </a:extLst>
+          </p:cNvPr>
+          <p:cNvSpPr>
+            <a:spLocks noGrp="1"/>
+          </p:cNvSpPr>
+          <p:nvPr>
+            <p:ph idx="1"/>
+          </p:nvPr>
+        </p:nvSpPr>
+        <p:spPr/>
+        <p:txBody>
+          <a:bodyPr/>
+          <a:lstStyle/>
+          <a:p>
+            <a:endParaRPr lang="en-CA"/>
+          </a:p>
+        </p:txBody>
+      </p:sp>
+    </p:spTree>
+    <p:extLst>
+      <p:ext uri="{BB962C8B-B14F-4D97-AF65-F5344CB8AC3E}">
+        <p14:creationId xmlns:p14="http://schemas.microsoft.com/office/powerpoint/2010/main" val="3523117603"/>
+      </p:ext>
+    </p:extLst>
+  </p:cSld>
+  <p:clrMapOvr>
+    <a:masterClrMapping/>
+  </p:clrMapOvr>
+</p:sld>
+</file>
+
+<file path=ppt/slides/slide8.xml><?xml version="1.0" encoding="utf-8"?>
 <p:sld xmlns:a="http://schemas.openxmlformats.org/drawingml/2006/main" xmlns:r="http://schemas.openxmlformats.org/officeDocument/2006/relationships" xmlns:p="http://schemas.openxmlformats.org/presentationml/2006/main">
   <p:cSld>
     <p:spTree>

</xml_diff>